<commit_message>
member variable name changed
</commit_message>
<xml_diff>
--- a/20221214_C++ OpenCV와 CUDA 기반 DBSCAN 코드의 연동 및 속도 최적화 .pptx
+++ b/20221214_C++ OpenCV와 CUDA 기반 DBSCAN 코드의 연동 및 속도 최적화 .pptx
@@ -28,21 +28,21 @@
   <p:notesSz cx="6858000" cy="9144000"/>
   <p:embeddedFontLst>
     <p:embeddedFont>
-      <p:font typeface="맑은 고딕" panose="020B0503020000020004" pitchFamily="50" charset="-127"/>
+      <p:font typeface="Roboto Slab" panose="020B0604020202020204" pitchFamily="2" charset="0"/>
       <p:regular r:id="rId18"/>
       <p:bold r:id="rId19"/>
     </p:embeddedFont>
     <p:embeddedFont>
-      <p:font typeface="Roboto Slab" panose="020B0600000101010101" charset="0"/>
+      <p:font typeface="Source Sans Pro" panose="020B0503030403020204" pitchFamily="34" charset="0"/>
       <p:regular r:id="rId20"/>
       <p:bold r:id="rId21"/>
+      <p:italic r:id="rId22"/>
+      <p:boldItalic r:id="rId23"/>
     </p:embeddedFont>
     <p:embeddedFont>
-      <p:font typeface="Source Sans Pro" panose="020B0503030403020204" pitchFamily="34" charset="0"/>
-      <p:regular r:id="rId22"/>
-      <p:bold r:id="rId23"/>
-      <p:italic r:id="rId24"/>
-      <p:boldItalic r:id="rId25"/>
+      <p:font typeface="맑은 고딕" panose="020B0503020000020004" pitchFamily="50" charset="-127"/>
+      <p:regular r:id="rId24"/>
+      <p:bold r:id="rId25"/>
     </p:embeddedFont>
   </p:embeddedFontLst>
   <p:defaultTextStyle>
@@ -2356,14 +2356,9 @@
   <p:cSld name="TITLE">
     <p:bg>
       <p:bgPr>
-        <a:blipFill>
-          <a:blip r:embed="rId2">
-            <a:alphaModFix/>
-          </a:blip>
-          <a:stretch>
-            <a:fillRect/>
-          </a:stretch>
-        </a:blipFill>
+        <a:solidFill>
+          <a:schemeClr val="bg1"/>
+        </a:solidFill>
         <a:effectLst/>
       </p:bgPr>
     </p:bg>
@@ -2507,686 +2502,6 @@
           </a:lstStyle>
           <a:p>
             <a:endParaRPr dirty="0"/>
-          </a:p>
-        </p:txBody>
-      </p:sp>
-      <p:sp>
-        <p:nvSpPr>
-          <p:cNvPr id="11" name="Google Shape;11;p2"/>
-          <p:cNvSpPr/>
-          <p:nvPr/>
-        </p:nvSpPr>
-        <p:spPr>
-          <a:xfrm>
-            <a:off x="7337531" y="4630074"/>
-            <a:ext cx="96300" cy="96000"/>
-          </a:xfrm>
-          <a:prstGeom prst="ellipse">
-            <a:avLst/>
-          </a:prstGeom>
-          <a:solidFill>
-            <a:schemeClr val="accent1"/>
-          </a:solidFill>
-          <a:ln w="19050" cap="flat" cmpd="sng">
-            <a:solidFill>
-              <a:schemeClr val="accent1"/>
-            </a:solidFill>
-            <a:prstDash val="solid"/>
-            <a:round/>
-            <a:headEnd type="none" w="sm" len="sm"/>
-            <a:tailEnd type="none" w="sm" len="sm"/>
-          </a:ln>
-        </p:spPr>
-        <p:txBody>
-          <a:bodyPr spcFirstLastPara="1" wrap="square" lIns="91425" tIns="91425" rIns="91425" bIns="91425" anchor="ctr" anchorCtr="0">
-            <a:noAutofit/>
-          </a:bodyPr>
-          <a:lstStyle/>
-          <a:p>
-            <a:pPr marL="0" lvl="0" indent="0" algn="l" rtl="0">
-              <a:spcBef>
-                <a:spcPts val="0"/>
-              </a:spcBef>
-              <a:spcAft>
-                <a:spcPts val="0"/>
-              </a:spcAft>
-              <a:buNone/>
-            </a:pPr>
-            <a:endParaRPr/>
-          </a:p>
-        </p:txBody>
-      </p:sp>
-      <p:sp>
-        <p:nvSpPr>
-          <p:cNvPr id="12" name="Google Shape;12;p2"/>
-          <p:cNvSpPr/>
-          <p:nvPr/>
-        </p:nvSpPr>
-        <p:spPr>
-          <a:xfrm>
-            <a:off x="7790243" y="4182401"/>
-            <a:ext cx="96300" cy="96000"/>
-          </a:xfrm>
-          <a:prstGeom prst="ellipse">
-            <a:avLst/>
-          </a:prstGeom>
-          <a:solidFill>
-            <a:schemeClr val="accent1"/>
-          </a:solidFill>
-          <a:ln w="19050" cap="flat" cmpd="sng">
-            <a:solidFill>
-              <a:schemeClr val="accent1"/>
-            </a:solidFill>
-            <a:prstDash val="solid"/>
-            <a:round/>
-            <a:headEnd type="none" w="sm" len="sm"/>
-            <a:tailEnd type="none" w="sm" len="sm"/>
-          </a:ln>
-        </p:spPr>
-        <p:txBody>
-          <a:bodyPr spcFirstLastPara="1" wrap="square" lIns="91425" tIns="91425" rIns="91425" bIns="91425" anchor="ctr" anchorCtr="0">
-            <a:noAutofit/>
-          </a:bodyPr>
-          <a:lstStyle/>
-          <a:p>
-            <a:pPr marL="0" lvl="0" indent="0" algn="l" rtl="0">
-              <a:spcBef>
-                <a:spcPts val="0"/>
-              </a:spcBef>
-              <a:spcAft>
-                <a:spcPts val="0"/>
-              </a:spcAft>
-              <a:buNone/>
-            </a:pPr>
-            <a:endParaRPr/>
-          </a:p>
-        </p:txBody>
-      </p:sp>
-      <p:sp>
-        <p:nvSpPr>
-          <p:cNvPr id="13" name="Google Shape;13;p2"/>
-          <p:cNvSpPr/>
-          <p:nvPr/>
-        </p:nvSpPr>
-        <p:spPr>
-          <a:xfrm>
-            <a:off x="8893253" y="3333348"/>
-            <a:ext cx="57600" cy="57600"/>
-          </a:xfrm>
-          <a:prstGeom prst="ellipse">
-            <a:avLst/>
-          </a:prstGeom>
-          <a:solidFill>
-            <a:schemeClr val="accent1"/>
-          </a:solidFill>
-          <a:ln w="19050" cap="flat" cmpd="sng">
-            <a:solidFill>
-              <a:schemeClr val="accent1"/>
-            </a:solidFill>
-            <a:prstDash val="solid"/>
-            <a:round/>
-            <a:headEnd type="none" w="sm" len="sm"/>
-            <a:tailEnd type="none" w="sm" len="sm"/>
-          </a:ln>
-        </p:spPr>
-        <p:txBody>
-          <a:bodyPr spcFirstLastPara="1" wrap="square" lIns="91425" tIns="91425" rIns="91425" bIns="91425" anchor="ctr" anchorCtr="0">
-            <a:noAutofit/>
-          </a:bodyPr>
-          <a:lstStyle/>
-          <a:p>
-            <a:pPr marL="0" lvl="0" indent="0" algn="l" rtl="0">
-              <a:spcBef>
-                <a:spcPts val="0"/>
-              </a:spcBef>
-              <a:spcAft>
-                <a:spcPts val="0"/>
-              </a:spcAft>
-              <a:buNone/>
-            </a:pPr>
-            <a:endParaRPr/>
-          </a:p>
-        </p:txBody>
-      </p:sp>
-      <p:sp>
-        <p:nvSpPr>
-          <p:cNvPr id="14" name="Google Shape;14;p2"/>
-          <p:cNvSpPr/>
-          <p:nvPr/>
-        </p:nvSpPr>
-        <p:spPr>
-          <a:xfrm>
-            <a:off x="8771302" y="4923775"/>
-            <a:ext cx="96300" cy="96000"/>
-          </a:xfrm>
-          <a:prstGeom prst="ellipse">
-            <a:avLst/>
-          </a:prstGeom>
-          <a:solidFill>
-            <a:schemeClr val="accent1"/>
-          </a:solidFill>
-          <a:ln w="19050" cap="flat" cmpd="sng">
-            <a:solidFill>
-              <a:schemeClr val="accent1"/>
-            </a:solidFill>
-            <a:prstDash val="solid"/>
-            <a:round/>
-            <a:headEnd type="none" w="sm" len="sm"/>
-            <a:tailEnd type="none" w="sm" len="sm"/>
-          </a:ln>
-        </p:spPr>
-        <p:txBody>
-          <a:bodyPr spcFirstLastPara="1" wrap="square" lIns="91425" tIns="91425" rIns="91425" bIns="91425" anchor="ctr" anchorCtr="0">
-            <a:noAutofit/>
-          </a:bodyPr>
-          <a:lstStyle/>
-          <a:p>
-            <a:pPr marL="0" lvl="0" indent="0" algn="l" rtl="0">
-              <a:spcBef>
-                <a:spcPts val="0"/>
-              </a:spcBef>
-              <a:spcAft>
-                <a:spcPts val="0"/>
-              </a:spcAft>
-              <a:buNone/>
-            </a:pPr>
-            <a:endParaRPr/>
-          </a:p>
-        </p:txBody>
-      </p:sp>
-      <p:sp>
-        <p:nvSpPr>
-          <p:cNvPr id="15" name="Google Shape;15;p2"/>
-          <p:cNvSpPr/>
-          <p:nvPr/>
-        </p:nvSpPr>
-        <p:spPr>
-          <a:xfrm>
-            <a:off x="2386266" y="508134"/>
-            <a:ext cx="96300" cy="96000"/>
-          </a:xfrm>
-          <a:prstGeom prst="ellipse">
-            <a:avLst/>
-          </a:prstGeom>
-          <a:solidFill>
-            <a:schemeClr val="accent1"/>
-          </a:solidFill>
-          <a:ln w="19050" cap="flat" cmpd="sng">
-            <a:solidFill>
-              <a:schemeClr val="accent1"/>
-            </a:solidFill>
-            <a:prstDash val="solid"/>
-            <a:round/>
-            <a:headEnd type="none" w="sm" len="sm"/>
-            <a:tailEnd type="none" w="sm" len="sm"/>
-          </a:ln>
-        </p:spPr>
-        <p:txBody>
-          <a:bodyPr spcFirstLastPara="1" wrap="square" lIns="91425" tIns="91425" rIns="91425" bIns="91425" anchor="ctr" anchorCtr="0">
-            <a:noAutofit/>
-          </a:bodyPr>
-          <a:lstStyle/>
-          <a:p>
-            <a:pPr marL="0" lvl="0" indent="0" algn="l" rtl="0">
-              <a:spcBef>
-                <a:spcPts val="0"/>
-              </a:spcBef>
-              <a:spcAft>
-                <a:spcPts val="0"/>
-              </a:spcAft>
-              <a:buNone/>
-            </a:pPr>
-            <a:endParaRPr/>
-          </a:p>
-        </p:txBody>
-      </p:sp>
-      <p:sp>
-        <p:nvSpPr>
-          <p:cNvPr id="16" name="Google Shape;16;p2"/>
-          <p:cNvSpPr/>
-          <p:nvPr/>
-        </p:nvSpPr>
-        <p:spPr>
-          <a:xfrm>
-            <a:off x="479460" y="2703980"/>
-            <a:ext cx="96300" cy="96000"/>
-          </a:xfrm>
-          <a:prstGeom prst="ellipse">
-            <a:avLst/>
-          </a:prstGeom>
-          <a:solidFill>
-            <a:schemeClr val="accent1"/>
-          </a:solidFill>
-          <a:ln w="19050" cap="flat" cmpd="sng">
-            <a:solidFill>
-              <a:schemeClr val="accent1"/>
-            </a:solidFill>
-            <a:prstDash val="solid"/>
-            <a:round/>
-            <a:headEnd type="none" w="sm" len="sm"/>
-            <a:tailEnd type="none" w="sm" len="sm"/>
-          </a:ln>
-        </p:spPr>
-        <p:txBody>
-          <a:bodyPr spcFirstLastPara="1" wrap="square" lIns="91425" tIns="91425" rIns="91425" bIns="91425" anchor="ctr" anchorCtr="0">
-            <a:noAutofit/>
-          </a:bodyPr>
-          <a:lstStyle/>
-          <a:p>
-            <a:pPr marL="0" lvl="0" indent="0" algn="l" rtl="0">
-              <a:spcBef>
-                <a:spcPts val="0"/>
-              </a:spcBef>
-              <a:spcAft>
-                <a:spcPts val="0"/>
-              </a:spcAft>
-              <a:buNone/>
-            </a:pPr>
-            <a:endParaRPr/>
-          </a:p>
-        </p:txBody>
-      </p:sp>
-      <p:sp>
-        <p:nvSpPr>
-          <p:cNvPr id="17" name="Google Shape;17;p2"/>
-          <p:cNvSpPr/>
-          <p:nvPr/>
-        </p:nvSpPr>
-        <p:spPr>
-          <a:xfrm>
-            <a:off x="261540" y="643097"/>
-            <a:ext cx="96300" cy="96000"/>
-          </a:xfrm>
-          <a:prstGeom prst="ellipse">
-            <a:avLst/>
-          </a:prstGeom>
-          <a:solidFill>
-            <a:schemeClr val="accent1"/>
-          </a:solidFill>
-          <a:ln w="19050" cap="flat" cmpd="sng">
-            <a:solidFill>
-              <a:schemeClr val="accent1"/>
-            </a:solidFill>
-            <a:prstDash val="solid"/>
-            <a:round/>
-            <a:headEnd type="none" w="sm" len="sm"/>
-            <a:tailEnd type="none" w="sm" len="sm"/>
-          </a:ln>
-        </p:spPr>
-        <p:txBody>
-          <a:bodyPr spcFirstLastPara="1" wrap="square" lIns="91425" tIns="91425" rIns="91425" bIns="91425" anchor="ctr" anchorCtr="0">
-            <a:noAutofit/>
-          </a:bodyPr>
-          <a:lstStyle/>
-          <a:p>
-            <a:pPr marL="0" lvl="0" indent="0" algn="l" rtl="0">
-              <a:spcBef>
-                <a:spcPts val="0"/>
-              </a:spcBef>
-              <a:spcAft>
-                <a:spcPts val="0"/>
-              </a:spcAft>
-              <a:buNone/>
-            </a:pPr>
-            <a:endParaRPr/>
-          </a:p>
-        </p:txBody>
-      </p:sp>
-      <p:sp>
-        <p:nvSpPr>
-          <p:cNvPr id="18" name="Google Shape;18;p2"/>
-          <p:cNvSpPr/>
-          <p:nvPr/>
-        </p:nvSpPr>
-        <p:spPr>
-          <a:xfrm>
-            <a:off x="507235" y="1080863"/>
-            <a:ext cx="192600" cy="192300"/>
-          </a:xfrm>
-          <a:prstGeom prst="ellipse">
-            <a:avLst/>
-          </a:prstGeom>
-          <a:noFill/>
-          <a:ln w="19050" cap="flat" cmpd="sng">
-            <a:solidFill>
-              <a:schemeClr val="accent1"/>
-            </a:solidFill>
-            <a:prstDash val="solid"/>
-            <a:round/>
-            <a:headEnd type="none" w="sm" len="sm"/>
-            <a:tailEnd type="none" w="sm" len="sm"/>
-          </a:ln>
-        </p:spPr>
-        <p:txBody>
-          <a:bodyPr spcFirstLastPara="1" wrap="square" lIns="91425" tIns="91425" rIns="91425" bIns="91425" anchor="ctr" anchorCtr="0">
-            <a:noAutofit/>
-          </a:bodyPr>
-          <a:lstStyle/>
-          <a:p>
-            <a:pPr marL="0" lvl="0" indent="0" algn="l" rtl="0">
-              <a:spcBef>
-                <a:spcPts val="0"/>
-              </a:spcBef>
-              <a:spcAft>
-                <a:spcPts val="0"/>
-              </a:spcAft>
-              <a:buNone/>
-            </a:pPr>
-            <a:endParaRPr/>
-          </a:p>
-        </p:txBody>
-      </p:sp>
-      <p:sp>
-        <p:nvSpPr>
-          <p:cNvPr id="19" name="Google Shape;19;p2"/>
-          <p:cNvSpPr/>
-          <p:nvPr/>
-        </p:nvSpPr>
-        <p:spPr>
-          <a:xfrm>
-            <a:off x="8314019" y="3625322"/>
-            <a:ext cx="144300" cy="144000"/>
-          </a:xfrm>
-          <a:prstGeom prst="ellipse">
-            <a:avLst/>
-          </a:prstGeom>
-          <a:noFill/>
-          <a:ln w="19050" cap="flat" cmpd="sng">
-            <a:solidFill>
-              <a:schemeClr val="accent1"/>
-            </a:solidFill>
-            <a:prstDash val="solid"/>
-            <a:round/>
-            <a:headEnd type="none" w="sm" len="sm"/>
-            <a:tailEnd type="none" w="sm" len="sm"/>
-          </a:ln>
-        </p:spPr>
-        <p:txBody>
-          <a:bodyPr spcFirstLastPara="1" wrap="square" lIns="91425" tIns="91425" rIns="91425" bIns="91425" anchor="ctr" anchorCtr="0">
-            <a:noAutofit/>
-          </a:bodyPr>
-          <a:lstStyle/>
-          <a:p>
-            <a:pPr marL="0" lvl="0" indent="0" algn="l" rtl="0">
-              <a:spcBef>
-                <a:spcPts val="0"/>
-              </a:spcBef>
-              <a:spcAft>
-                <a:spcPts val="0"/>
-              </a:spcAft>
-              <a:buNone/>
-            </a:pPr>
-            <a:endParaRPr/>
-          </a:p>
-        </p:txBody>
-      </p:sp>
-      <p:sp>
-        <p:nvSpPr>
-          <p:cNvPr id="20" name="Google Shape;20;p2"/>
-          <p:cNvSpPr/>
-          <p:nvPr/>
-        </p:nvSpPr>
-        <p:spPr>
-          <a:xfrm>
-            <a:off x="8882858" y="4186761"/>
-            <a:ext cx="144300" cy="144000"/>
-          </a:xfrm>
-          <a:prstGeom prst="ellipse">
-            <a:avLst/>
-          </a:prstGeom>
-          <a:noFill/>
-          <a:ln w="19050" cap="flat" cmpd="sng">
-            <a:solidFill>
-              <a:schemeClr val="accent1"/>
-            </a:solidFill>
-            <a:prstDash val="solid"/>
-            <a:round/>
-            <a:headEnd type="none" w="sm" len="sm"/>
-            <a:tailEnd type="none" w="sm" len="sm"/>
-          </a:ln>
-        </p:spPr>
-        <p:txBody>
-          <a:bodyPr spcFirstLastPara="1" wrap="square" lIns="91425" tIns="91425" rIns="91425" bIns="91425" anchor="ctr" anchorCtr="0">
-            <a:noAutofit/>
-          </a:bodyPr>
-          <a:lstStyle/>
-          <a:p>
-            <a:pPr marL="0" lvl="0" indent="0" algn="l" rtl="0">
-              <a:spcBef>
-                <a:spcPts val="0"/>
-              </a:spcBef>
-              <a:spcAft>
-                <a:spcPts val="0"/>
-              </a:spcAft>
-              <a:buNone/>
-            </a:pPr>
-            <a:endParaRPr/>
-          </a:p>
-        </p:txBody>
-      </p:sp>
-      <p:sp>
-        <p:nvSpPr>
-          <p:cNvPr id="21" name="Google Shape;21;p2"/>
-          <p:cNvSpPr/>
-          <p:nvPr/>
-        </p:nvSpPr>
-        <p:spPr>
-          <a:xfrm>
-            <a:off x="158313" y="1596559"/>
-            <a:ext cx="57600" cy="57600"/>
-          </a:xfrm>
-          <a:prstGeom prst="ellipse">
-            <a:avLst/>
-          </a:prstGeom>
-          <a:solidFill>
-            <a:schemeClr val="accent1"/>
-          </a:solidFill>
-          <a:ln w="19050" cap="flat" cmpd="sng">
-            <a:solidFill>
-              <a:schemeClr val="accent1"/>
-            </a:solidFill>
-            <a:prstDash val="solid"/>
-            <a:round/>
-            <a:headEnd type="none" w="sm" len="sm"/>
-            <a:tailEnd type="none" w="sm" len="sm"/>
-          </a:ln>
-        </p:spPr>
-        <p:txBody>
-          <a:bodyPr spcFirstLastPara="1" wrap="square" lIns="91425" tIns="91425" rIns="91425" bIns="91425" anchor="ctr" anchorCtr="0">
-            <a:noAutofit/>
-          </a:bodyPr>
-          <a:lstStyle/>
-          <a:p>
-            <a:pPr marL="0" lvl="0" indent="0" algn="l" rtl="0">
-              <a:spcBef>
-                <a:spcPts val="0"/>
-              </a:spcBef>
-              <a:spcAft>
-                <a:spcPts val="0"/>
-              </a:spcAft>
-              <a:buNone/>
-            </a:pPr>
-            <a:endParaRPr/>
-          </a:p>
-        </p:txBody>
-      </p:sp>
-      <p:sp>
-        <p:nvSpPr>
-          <p:cNvPr id="22" name="Google Shape;22;p2"/>
-          <p:cNvSpPr/>
-          <p:nvPr/>
-        </p:nvSpPr>
-        <p:spPr>
-          <a:xfrm>
-            <a:off x="1396483" y="226428"/>
-            <a:ext cx="192600" cy="192300"/>
-          </a:xfrm>
-          <a:prstGeom prst="ellipse">
-            <a:avLst/>
-          </a:prstGeom>
-          <a:noFill/>
-          <a:ln w="19050" cap="flat" cmpd="sng">
-            <a:solidFill>
-              <a:schemeClr val="accent1"/>
-            </a:solidFill>
-            <a:prstDash val="solid"/>
-            <a:round/>
-            <a:headEnd type="none" w="sm" len="sm"/>
-            <a:tailEnd type="none" w="sm" len="sm"/>
-          </a:ln>
-        </p:spPr>
-        <p:txBody>
-          <a:bodyPr spcFirstLastPara="1" wrap="square" lIns="91425" tIns="91425" rIns="91425" bIns="91425" anchor="ctr" anchorCtr="0">
-            <a:noAutofit/>
-          </a:bodyPr>
-          <a:lstStyle/>
-          <a:p>
-            <a:pPr marL="0" lvl="0" indent="0" algn="l" rtl="0">
-              <a:spcBef>
-                <a:spcPts val="0"/>
-              </a:spcBef>
-              <a:spcAft>
-                <a:spcPts val="0"/>
-              </a:spcAft>
-              <a:buNone/>
-            </a:pPr>
-            <a:endParaRPr/>
-          </a:p>
-        </p:txBody>
-      </p:sp>
-      <p:sp>
-        <p:nvSpPr>
-          <p:cNvPr id="23" name="Google Shape;23;p2"/>
-          <p:cNvSpPr/>
-          <p:nvPr/>
-        </p:nvSpPr>
-        <p:spPr>
-          <a:xfrm>
-            <a:off x="617492" y="2000594"/>
-            <a:ext cx="57600" cy="57600"/>
-          </a:xfrm>
-          <a:prstGeom prst="ellipse">
-            <a:avLst/>
-          </a:prstGeom>
-          <a:solidFill>
-            <a:schemeClr val="accent1"/>
-          </a:solidFill>
-          <a:ln w="19050" cap="flat" cmpd="sng">
-            <a:solidFill>
-              <a:schemeClr val="accent1"/>
-            </a:solidFill>
-            <a:prstDash val="solid"/>
-            <a:round/>
-            <a:headEnd type="none" w="sm" len="sm"/>
-            <a:tailEnd type="none" w="sm" len="sm"/>
-          </a:ln>
-        </p:spPr>
-        <p:txBody>
-          <a:bodyPr spcFirstLastPara="1" wrap="square" lIns="91425" tIns="91425" rIns="91425" bIns="91425" anchor="ctr" anchorCtr="0">
-            <a:noAutofit/>
-          </a:bodyPr>
-          <a:lstStyle/>
-          <a:p>
-            <a:pPr marL="0" lvl="0" indent="0" algn="l" rtl="0">
-              <a:spcBef>
-                <a:spcPts val="0"/>
-              </a:spcBef>
-              <a:spcAft>
-                <a:spcPts val="0"/>
-              </a:spcAft>
-              <a:buNone/>
-            </a:pPr>
-            <a:endParaRPr/>
-          </a:p>
-        </p:txBody>
-      </p:sp>
-      <p:sp>
-        <p:nvSpPr>
-          <p:cNvPr id="24" name="Google Shape;24;p2"/>
-          <p:cNvSpPr/>
-          <p:nvPr/>
-        </p:nvSpPr>
-        <p:spPr>
-          <a:xfrm>
-            <a:off x="3425273" y="387880"/>
-            <a:ext cx="57600" cy="57600"/>
-          </a:xfrm>
-          <a:prstGeom prst="ellipse">
-            <a:avLst/>
-          </a:prstGeom>
-          <a:solidFill>
-            <a:schemeClr val="accent1"/>
-          </a:solidFill>
-          <a:ln w="19050" cap="flat" cmpd="sng">
-            <a:solidFill>
-              <a:schemeClr val="accent1"/>
-            </a:solidFill>
-            <a:prstDash val="solid"/>
-            <a:round/>
-            <a:headEnd type="none" w="sm" len="sm"/>
-            <a:tailEnd type="none" w="sm" len="sm"/>
-          </a:ln>
-        </p:spPr>
-        <p:txBody>
-          <a:bodyPr spcFirstLastPara="1" wrap="square" lIns="91425" tIns="91425" rIns="91425" bIns="91425" anchor="ctr" anchorCtr="0">
-            <a:noAutofit/>
-          </a:bodyPr>
-          <a:lstStyle/>
-          <a:p>
-            <a:pPr marL="0" lvl="0" indent="0" algn="l" rtl="0">
-              <a:spcBef>
-                <a:spcPts val="0"/>
-              </a:spcBef>
-              <a:spcAft>
-                <a:spcPts val="0"/>
-              </a:spcAft>
-              <a:buNone/>
-            </a:pPr>
-            <a:endParaRPr/>
-          </a:p>
-        </p:txBody>
-      </p:sp>
-      <p:sp>
-        <p:nvSpPr>
-          <p:cNvPr id="25" name="Google Shape;25;p2"/>
-          <p:cNvSpPr/>
-          <p:nvPr/>
-        </p:nvSpPr>
-        <p:spPr>
-          <a:xfrm>
-            <a:off x="8014029" y="4567546"/>
-            <a:ext cx="192600" cy="192300"/>
-          </a:xfrm>
-          <a:prstGeom prst="ellipse">
-            <a:avLst/>
-          </a:prstGeom>
-          <a:noFill/>
-          <a:ln w="19050" cap="flat" cmpd="sng">
-            <a:solidFill>
-              <a:schemeClr val="accent1"/>
-            </a:solidFill>
-            <a:prstDash val="solid"/>
-            <a:round/>
-            <a:headEnd type="none" w="sm" len="sm"/>
-            <a:tailEnd type="none" w="sm" len="sm"/>
-          </a:ln>
-        </p:spPr>
-        <p:txBody>
-          <a:bodyPr spcFirstLastPara="1" wrap="square" lIns="91425" tIns="91425" rIns="91425" bIns="91425" anchor="ctr" anchorCtr="0">
-            <a:noAutofit/>
-          </a:bodyPr>
-          <a:lstStyle/>
-          <a:p>
-            <a:pPr marL="0" lvl="0" indent="0" algn="l" rtl="0">
-              <a:spcBef>
-                <a:spcPts val="0"/>
-              </a:spcBef>
-              <a:spcAft>
-                <a:spcPts val="0"/>
-              </a:spcAft>
-              <a:buNone/>
-            </a:pPr>
-            <a:endParaRPr/>
           </a:p>
         </p:txBody>
       </p:sp>
@@ -3694,14 +3009,9 @@
   <p:cSld name="simple-light">
     <p:bg>
       <p:bgPr>
-        <a:blipFill>
-          <a:blip r:embed="rId4">
-            <a:alphaModFix/>
-          </a:blip>
-          <a:stretch>
-            <a:fillRect/>
-          </a:stretch>
-        </a:blipFill>
+        <a:solidFill>
+          <a:schemeClr val="bg1"/>
+        </a:solidFill>
         <a:effectLst/>
       </p:bgPr>
     </p:bg>
@@ -5093,7 +4403,7 @@
         </p:nvSpPr>
         <p:spPr>
           <a:xfrm>
-            <a:off x="1424511" y="1991850"/>
+            <a:off x="664842" y="1991850"/>
             <a:ext cx="7814316" cy="1159800"/>
           </a:xfrm>
           <a:prstGeom prst="rect">
@@ -5106,7 +4416,7 @@
           </a:bodyPr>
           <a:lstStyle/>
           <a:p>
-            <a:pPr marL="0" lvl="0" indent="0" algn="l" rtl="0">
+            <a:pPr marL="0" lvl="0" indent="0" algn="ctr" rtl="0">
               <a:lnSpc>
                 <a:spcPct val="150000"/>
               </a:lnSpc>
@@ -5119,7 +4429,7 @@
               <a:buNone/>
             </a:pPr>
             <a:r>
-              <a:rPr lang="en-US" altLang="ko-KR" sz="3500" dirty="0">
+              <a:rPr lang="en-US" altLang="ko-KR" sz="3500" b="1" dirty="0">
                 <a:latin typeface="+mj-ea"/>
                 <a:ea typeface="+mj-ea"/>
                 <a:cs typeface="Arial" panose="020B0604020202020204" pitchFamily="34" charset="0"/>
@@ -5127,7 +4437,7 @@
               <a:t>C++ </a:t>
             </a:r>
             <a:r>
-              <a:rPr lang="en-US" altLang="ko-KR" sz="3500" dirty="0" err="1">
+              <a:rPr lang="en-US" altLang="ko-KR" sz="3500" b="1" dirty="0" err="1">
                 <a:latin typeface="+mj-ea"/>
                 <a:ea typeface="+mj-ea"/>
                 <a:cs typeface="Arial" panose="020B0604020202020204" pitchFamily="34" charset="0"/>
@@ -5135,7 +4445,7 @@
               <a:t>OpenCV와</a:t>
             </a:r>
             <a:r>
-              <a:rPr lang="en-US" altLang="ko-KR" sz="3500" dirty="0">
+              <a:rPr lang="en-US" altLang="ko-KR" sz="3500" b="1" dirty="0">
                 <a:latin typeface="+mj-ea"/>
                 <a:ea typeface="+mj-ea"/>
                 <a:cs typeface="Arial" panose="020B0604020202020204" pitchFamily="34" charset="0"/>
@@ -5143,7 +4453,7 @@
               <a:t> CUDA </a:t>
             </a:r>
             <a:r>
-              <a:rPr lang="en-US" altLang="ko-KR" sz="3500" dirty="0" err="1">
+              <a:rPr lang="en-US" altLang="ko-KR" sz="3500" b="1" dirty="0" err="1">
                 <a:latin typeface="+mj-ea"/>
                 <a:ea typeface="+mj-ea"/>
                 <a:cs typeface="Arial" panose="020B0604020202020204" pitchFamily="34" charset="0"/>
@@ -5151,7 +4461,7 @@
               <a:t>기반</a:t>
             </a:r>
             <a:r>
-              <a:rPr lang="en-US" altLang="ko-KR" sz="3500" dirty="0">
+              <a:rPr lang="en-US" altLang="ko-KR" sz="3500" b="1" dirty="0">
                 <a:latin typeface="+mj-ea"/>
                 <a:ea typeface="+mj-ea"/>
                 <a:cs typeface="Arial" panose="020B0604020202020204" pitchFamily="34" charset="0"/>
@@ -5159,14 +4469,14 @@
               <a:t> </a:t>
             </a:r>
             <a:br>
-              <a:rPr lang="en-US" altLang="ko-KR" sz="3500" dirty="0">
+              <a:rPr lang="en-US" altLang="ko-KR" sz="3500" b="1" dirty="0">
                 <a:latin typeface="+mj-ea"/>
                 <a:ea typeface="+mj-ea"/>
                 <a:cs typeface="Arial" panose="020B0604020202020204" pitchFamily="34" charset="0"/>
               </a:rPr>
             </a:br>
             <a:r>
-              <a:rPr lang="en-US" altLang="ko-KR" sz="3500" dirty="0">
+              <a:rPr lang="en-US" altLang="ko-KR" sz="3500" b="1" dirty="0">
                 <a:latin typeface="+mj-ea"/>
                 <a:ea typeface="+mj-ea"/>
                 <a:cs typeface="Arial" panose="020B0604020202020204" pitchFamily="34" charset="0"/>
@@ -5174,7 +4484,7 @@
               <a:t>DBSCAN </a:t>
             </a:r>
             <a:r>
-              <a:rPr lang="en-US" altLang="ko-KR" sz="3500" dirty="0" err="1">
+              <a:rPr lang="en-US" altLang="ko-KR" sz="3500" b="1" dirty="0" err="1">
                 <a:latin typeface="+mj-ea"/>
                 <a:ea typeface="+mj-ea"/>
                 <a:cs typeface="Arial" panose="020B0604020202020204" pitchFamily="34" charset="0"/>
@@ -5182,7 +4492,7 @@
               <a:t>코드의</a:t>
             </a:r>
             <a:r>
-              <a:rPr lang="en-US" altLang="ko-KR" sz="3500" dirty="0">
+              <a:rPr lang="en-US" altLang="ko-KR" sz="3500" b="1" dirty="0">
                 <a:latin typeface="+mj-ea"/>
                 <a:ea typeface="+mj-ea"/>
                 <a:cs typeface="Arial" panose="020B0604020202020204" pitchFamily="34" charset="0"/>
@@ -5190,7 +4500,7 @@
               <a:t> </a:t>
             </a:r>
             <a:r>
-              <a:rPr lang="en-US" altLang="ko-KR" sz="3500" dirty="0" err="1">
+              <a:rPr lang="en-US" altLang="ko-KR" sz="3500" b="1" dirty="0" err="1">
                 <a:latin typeface="+mj-ea"/>
                 <a:ea typeface="+mj-ea"/>
                 <a:cs typeface="Arial" panose="020B0604020202020204" pitchFamily="34" charset="0"/>
@@ -5198,7 +4508,7 @@
               <a:t>연동</a:t>
             </a:r>
             <a:r>
-              <a:rPr lang="en-US" altLang="ko-KR" sz="3500" dirty="0">
+              <a:rPr lang="en-US" altLang="ko-KR" sz="3500" b="1" dirty="0">
                 <a:latin typeface="+mj-ea"/>
                 <a:ea typeface="+mj-ea"/>
                 <a:cs typeface="Arial" panose="020B0604020202020204" pitchFamily="34" charset="0"/>
@@ -5206,7 +4516,7 @@
               <a:t> 및 </a:t>
             </a:r>
             <a:r>
-              <a:rPr lang="en-US" altLang="ko-KR" sz="3500" dirty="0" err="1">
+              <a:rPr lang="en-US" altLang="ko-KR" sz="3500" b="1" dirty="0" err="1">
                 <a:latin typeface="+mj-ea"/>
                 <a:ea typeface="+mj-ea"/>
                 <a:cs typeface="Arial" panose="020B0604020202020204" pitchFamily="34" charset="0"/>
@@ -5214,7 +4524,7 @@
               <a:t>속도</a:t>
             </a:r>
             <a:r>
-              <a:rPr lang="en-US" altLang="ko-KR" sz="3500" dirty="0">
+              <a:rPr lang="en-US" altLang="ko-KR" sz="3500" b="1" dirty="0">
                 <a:latin typeface="+mj-ea"/>
                 <a:ea typeface="+mj-ea"/>
                 <a:cs typeface="Arial" panose="020B0604020202020204" pitchFamily="34" charset="0"/>
@@ -5222,7 +4532,7 @@
               <a:t> </a:t>
             </a:r>
             <a:r>
-              <a:rPr lang="en-US" altLang="ko-KR" sz="3500" dirty="0" err="1">
+              <a:rPr lang="en-US" altLang="ko-KR" sz="3500" b="1" dirty="0" err="1">
                 <a:latin typeface="+mj-ea"/>
                 <a:ea typeface="+mj-ea"/>
                 <a:cs typeface="Arial" panose="020B0604020202020204" pitchFamily="34" charset="0"/>
@@ -5230,14 +4540,14 @@
               <a:t>최적화</a:t>
             </a:r>
             <a:r>
-              <a:rPr lang="ko-KR" altLang="en-US" sz="3500" dirty="0">
+              <a:rPr lang="ko-KR" altLang="en-US" sz="3500" b="1" dirty="0">
                 <a:latin typeface="+mj-ea"/>
                 <a:ea typeface="+mj-ea"/>
                 <a:cs typeface="Arial" panose="020B0604020202020204" pitchFamily="34" charset="0"/>
               </a:rPr>
               <a:t> </a:t>
             </a:r>
-            <a:endParaRPr sz="3500" dirty="0">
+            <a:endParaRPr sz="3500" b="1" dirty="0">
               <a:latin typeface="+mj-ea"/>
               <a:ea typeface="+mj-ea"/>
               <a:cs typeface="Arial" panose="020B0604020202020204" pitchFamily="34" charset="0"/>
@@ -5727,7 +5037,7 @@
         <p:spPr>
           <a:xfrm>
             <a:off x="4156363" y="2094151"/>
-            <a:ext cx="4436033" cy="955198"/>
+            <a:ext cx="4436033" cy="1255600"/>
           </a:xfrm>
           <a:prstGeom prst="rect">
             <a:avLst/>
@@ -5794,6 +5104,36 @@
             <a:r>
               <a:rPr lang="ko-KR" altLang="en-US" sz="1300" dirty="0"/>
               <a:t>개 정사각형 포인트 군집 존재</a:t>
+            </a:r>
+            <a:endParaRPr lang="en-US" altLang="ko-KR" sz="1300" dirty="0"/>
+          </a:p>
+          <a:p>
+            <a:pPr>
+              <a:lnSpc>
+                <a:spcPct val="150000"/>
+              </a:lnSpc>
+            </a:pPr>
+            <a:r>
+              <a:rPr lang="en-US" altLang="ko-KR" sz="1300" dirty="0"/>
+              <a:t>  -</a:t>
+            </a:r>
+            <a:r>
+              <a:rPr lang="en-US" altLang="ko-KR" sz="1300" dirty="0">
+                <a:sym typeface="Wingdings" panose="05000000000000000000" pitchFamily="2" charset="2"/>
+              </a:rPr>
+              <a:t> </a:t>
+            </a:r>
+            <a:r>
+              <a:rPr lang="ko-KR" altLang="en-US" sz="1300" dirty="0">
+                <a:sym typeface="Wingdings" panose="05000000000000000000" pitchFamily="2" charset="2"/>
+              </a:rPr>
+              <a:t>확인</a:t>
+            </a:r>
+            <a:r>
+              <a:rPr lang="en-US" altLang="ko-KR" sz="1300" dirty="0">
+                <a:sym typeface="Wingdings" panose="05000000000000000000" pitchFamily="2" charset="2"/>
+              </a:rPr>
+              <a:t>!!</a:t>
             </a:r>
             <a:endParaRPr lang="en-US" altLang="ko-KR" sz="1300" dirty="0"/>
           </a:p>
@@ -6948,6 +6288,52 @@
           </a:p>
         </p:txBody>
       </p:sp>
+      <p:sp>
+        <p:nvSpPr>
+          <p:cNvPr id="2" name="직사각형 1">
+            <a:extLst>
+              <a:ext uri="{FF2B5EF4-FFF2-40B4-BE49-F238E27FC236}">
+                <a16:creationId xmlns:a16="http://schemas.microsoft.com/office/drawing/2014/main" id="{42CF6751-33E5-BA75-D9ED-2B77FC3ED7F6}"/>
+              </a:ext>
+            </a:extLst>
+          </p:cNvPr>
+          <p:cNvSpPr/>
+          <p:nvPr/>
+        </p:nvSpPr>
+        <p:spPr>
+          <a:xfrm>
+            <a:off x="3613949" y="3644153"/>
+            <a:ext cx="2293542" cy="444847"/>
+          </a:xfrm>
+          <a:prstGeom prst="rect">
+            <a:avLst/>
+          </a:prstGeom>
+        </p:spPr>
+        <p:style>
+          <a:lnRef idx="2">
+            <a:schemeClr val="accent5">
+              <a:shade val="50000"/>
+            </a:schemeClr>
+          </a:lnRef>
+          <a:fillRef idx="1">
+            <a:schemeClr val="accent5"/>
+          </a:fillRef>
+          <a:effectRef idx="0">
+            <a:schemeClr val="accent5"/>
+          </a:effectRef>
+          <a:fontRef idx="minor">
+            <a:schemeClr val="lt1"/>
+          </a:fontRef>
+        </p:style>
+        <p:txBody>
+          <a:bodyPr rtlCol="0" anchor="ctr"/>
+          <a:lstStyle/>
+          <a:p>
+            <a:pPr algn="ctr"/>
+            <a:endParaRPr lang="ko-KR" altLang="en-US" dirty="0"/>
+          </a:p>
+        </p:txBody>
+      </p:sp>
     </p:spTree>
     <p:extLst>
       <p:ext uri="{BB962C8B-B14F-4D97-AF65-F5344CB8AC3E}">
@@ -7017,7 +6403,21 @@
                 <a:latin typeface="+mn-ea"/>
                 <a:ea typeface="+mn-ea"/>
               </a:rPr>
-              <a:t>NVIDIA Nsight Systems </a:t>
+              <a:t>NVIDIA Nsight Systems(</a:t>
+            </a:r>
+            <a:r>
+              <a:rPr lang="ko-KR" altLang="en-US" b="1" dirty="0">
+                <a:latin typeface="+mn-ea"/>
+                <a:ea typeface="+mn-ea"/>
+              </a:rPr>
+              <a:t>설명 추가</a:t>
+            </a:r>
+            <a:r>
+              <a:rPr lang="en-US" altLang="ko-KR" b="1" dirty="0">
+                <a:latin typeface="+mn-ea"/>
+                <a:ea typeface="+mn-ea"/>
+              </a:rPr>
+              <a:t>) </a:t>
             </a:r>
             <a:r>
               <a:rPr lang="ko-KR" altLang="en-US" b="1" dirty="0">
@@ -12408,6 +11808,18 @@
               <a:buChar char="•"/>
             </a:pPr>
             <a:r>
+              <a:rPr lang="ko-KR" altLang="en-US" sz="1300" dirty="0">
+                <a:solidFill>
+                  <a:srgbClr val="C00000"/>
+                </a:solidFill>
+                <a:latin typeface="+mj-lt"/>
+                <a:ea typeface="Source Sans Pro"/>
+                <a:cs typeface="Source Sans Pro"/>
+                <a:sym typeface="Wingdings" panose="05000000000000000000" pitchFamily="2" charset="2"/>
+              </a:rPr>
+              <a:t>단점</a:t>
+            </a:r>
+            <a:r>
               <a:rPr lang="en-US" altLang="ko-KR" sz="1300" dirty="0">
                 <a:solidFill>
                   <a:srgbClr val="C00000"/>
@@ -12417,7 +11829,7 @@
                 <a:cs typeface="Source Sans Pro"/>
                 <a:sym typeface="Wingdings" panose="05000000000000000000" pitchFamily="2" charset="2"/>
               </a:rPr>
-              <a:t>OpenCV </a:t>
+              <a:t>: OpenCV </a:t>
             </a:r>
             <a:r>
               <a:rPr lang="ko-KR" altLang="en-US" sz="1300" dirty="0">
@@ -20690,7 +20102,7 @@
                   </a:schemeClr>
                 </a:solidFill>
               </a:rPr>
-              <a:t>초기화 됨</a:t>
+              <a:t>초기화 완료</a:t>
             </a:r>
             <a:r>
               <a:rPr lang="en-US" altLang="ko-KR" dirty="0">

</xml_diff>